<commit_message>
Alteracao cor de fundo no titulo do pitch
Alteracao cor de fundo no titulo do pitch (amarelo)
</commit_message>
<xml_diff>
--- a/PastaDocsKickoff/PITCH.pptx
+++ b/PastaDocsKickoff/PITCH.pptx
@@ -210,7 +210,7 @@
           <a:p>
             <a:fld id="{B6D4C934-FEA0-426E-B081-61FE807EA637}" type="datetimeFigureOut">
               <a:rPr lang="pt-BR" smtClean="0"/>
-              <a:t>27/01/2023</a:t>
+              <a:t>08/03/2024</a:t>
             </a:fld>
             <a:endParaRPr lang="pt-BR"/>
           </a:p>
@@ -368,7 +368,7 @@
           <a:p>
             <a:fld id="{F69DE88B-C5FB-4190-8CD8-D803F1201C56}" type="slidenum">
               <a:rPr lang="pt-BR" smtClean="0"/>
-              <a:t>‹nº›</a:t>
+              <a:t>‹#›</a:t>
             </a:fld>
             <a:endParaRPr lang="pt-BR"/>
           </a:p>
@@ -1052,7 +1052,7 @@
           <a:p>
             <a:fld id="{89C4B140-6DEB-45EB-A5FE-2FE213A19AB6}" type="datetimeFigureOut">
               <a:rPr lang="pt-BR" smtClean="0"/>
-              <a:t>27/01/2023</a:t>
+              <a:t>08/03/2024</a:t>
             </a:fld>
             <a:endParaRPr lang="pt-BR"/>
           </a:p>
@@ -1110,7 +1110,7 @@
           <a:p>
             <a:fld id="{1BC5D9AF-0A3A-46C6-9823-3468E6F7B9BB}" type="slidenum">
               <a:rPr lang="pt-BR" smtClean="0"/>
-              <a:t>‹nº›</a:t>
+              <a:t>‹#›</a:t>
             </a:fld>
             <a:endParaRPr lang="pt-BR"/>
           </a:p>
@@ -1260,7 +1260,7 @@
           <a:p>
             <a:fld id="{89C4B140-6DEB-45EB-A5FE-2FE213A19AB6}" type="datetimeFigureOut">
               <a:rPr lang="pt-BR" smtClean="0"/>
-              <a:t>27/01/2023</a:t>
+              <a:t>08/03/2024</a:t>
             </a:fld>
             <a:endParaRPr lang="pt-BR"/>
           </a:p>
@@ -1318,7 +1318,7 @@
           <a:p>
             <a:fld id="{1BC5D9AF-0A3A-46C6-9823-3468E6F7B9BB}" type="slidenum">
               <a:rPr lang="pt-BR" smtClean="0"/>
-              <a:t>‹nº›</a:t>
+              <a:t>‹#›</a:t>
             </a:fld>
             <a:endParaRPr lang="pt-BR"/>
           </a:p>
@@ -1468,7 +1468,7 @@
           <a:p>
             <a:fld id="{89C4B140-6DEB-45EB-A5FE-2FE213A19AB6}" type="datetimeFigureOut">
               <a:rPr lang="pt-BR" smtClean="0"/>
-              <a:t>27/01/2023</a:t>
+              <a:t>08/03/2024</a:t>
             </a:fld>
             <a:endParaRPr lang="pt-BR"/>
           </a:p>
@@ -1526,7 +1526,7 @@
           <a:p>
             <a:fld id="{1BC5D9AF-0A3A-46C6-9823-3468E6F7B9BB}" type="slidenum">
               <a:rPr lang="pt-BR" smtClean="0"/>
-              <a:t>‹nº›</a:t>
+              <a:t>‹#›</a:t>
             </a:fld>
             <a:endParaRPr lang="pt-BR"/>
           </a:p>
@@ -1724,7 +1724,7 @@
               <a:pPr>
                 <a:defRPr/>
               </a:pPr>
-              <a:t>‹nº›</a:t>
+              <a:t>‹#›</a:t>
             </a:fld>
             <a:endParaRPr lang="pt-BR"/>
           </a:p>
@@ -1874,7 +1874,7 @@
           <a:p>
             <a:fld id="{89C4B140-6DEB-45EB-A5FE-2FE213A19AB6}" type="datetimeFigureOut">
               <a:rPr lang="pt-BR" smtClean="0"/>
-              <a:t>27/01/2023</a:t>
+              <a:t>08/03/2024</a:t>
             </a:fld>
             <a:endParaRPr lang="pt-BR"/>
           </a:p>
@@ -1932,7 +1932,7 @@
           <a:p>
             <a:fld id="{1BC5D9AF-0A3A-46C6-9823-3468E6F7B9BB}" type="slidenum">
               <a:rPr lang="pt-BR" smtClean="0"/>
-              <a:t>‹nº›</a:t>
+              <a:t>‹#›</a:t>
             </a:fld>
             <a:endParaRPr lang="pt-BR"/>
           </a:p>
@@ -2149,7 +2149,7 @@
           <a:p>
             <a:fld id="{89C4B140-6DEB-45EB-A5FE-2FE213A19AB6}" type="datetimeFigureOut">
               <a:rPr lang="pt-BR" smtClean="0"/>
-              <a:t>27/01/2023</a:t>
+              <a:t>08/03/2024</a:t>
             </a:fld>
             <a:endParaRPr lang="pt-BR"/>
           </a:p>
@@ -2207,7 +2207,7 @@
           <a:p>
             <a:fld id="{1BC5D9AF-0A3A-46C6-9823-3468E6F7B9BB}" type="slidenum">
               <a:rPr lang="pt-BR" smtClean="0"/>
-              <a:t>‹nº›</a:t>
+              <a:t>‹#›</a:t>
             </a:fld>
             <a:endParaRPr lang="pt-BR"/>
           </a:p>
@@ -2472,7 +2472,7 @@
           <a:p>
             <a:fld id="{89C4B140-6DEB-45EB-A5FE-2FE213A19AB6}" type="datetimeFigureOut">
               <a:rPr lang="pt-BR" smtClean="0"/>
-              <a:t>27/01/2023</a:t>
+              <a:t>08/03/2024</a:t>
             </a:fld>
             <a:endParaRPr lang="pt-BR"/>
           </a:p>
@@ -2530,7 +2530,7 @@
           <a:p>
             <a:fld id="{1BC5D9AF-0A3A-46C6-9823-3468E6F7B9BB}" type="slidenum">
               <a:rPr lang="pt-BR" smtClean="0"/>
-              <a:t>‹nº›</a:t>
+              <a:t>‹#›</a:t>
             </a:fld>
             <a:endParaRPr lang="pt-BR"/>
           </a:p>
@@ -2935,7 +2935,7 @@
           <a:p>
             <a:fld id="{89C4B140-6DEB-45EB-A5FE-2FE213A19AB6}" type="datetimeFigureOut">
               <a:rPr lang="pt-BR" smtClean="0"/>
-              <a:t>27/01/2023</a:t>
+              <a:t>08/03/2024</a:t>
             </a:fld>
             <a:endParaRPr lang="pt-BR"/>
           </a:p>
@@ -2993,7 +2993,7 @@
           <a:p>
             <a:fld id="{1BC5D9AF-0A3A-46C6-9823-3468E6F7B9BB}" type="slidenum">
               <a:rPr lang="pt-BR" smtClean="0"/>
-              <a:t>‹nº›</a:t>
+              <a:t>‹#›</a:t>
             </a:fld>
             <a:endParaRPr lang="pt-BR"/>
           </a:p>
@@ -3084,7 +3084,7 @@
           <a:p>
             <a:fld id="{89C4B140-6DEB-45EB-A5FE-2FE213A19AB6}" type="datetimeFigureOut">
               <a:rPr lang="pt-BR" smtClean="0"/>
-              <a:t>27/01/2023</a:t>
+              <a:t>08/03/2024</a:t>
             </a:fld>
             <a:endParaRPr lang="pt-BR"/>
           </a:p>
@@ -3142,7 +3142,7 @@
           <a:p>
             <a:fld id="{1BC5D9AF-0A3A-46C6-9823-3468E6F7B9BB}" type="slidenum">
               <a:rPr lang="pt-BR" smtClean="0"/>
-              <a:t>‹nº›</a:t>
+              <a:t>‹#›</a:t>
             </a:fld>
             <a:endParaRPr lang="pt-BR"/>
           </a:p>
@@ -3203,7 +3203,7 @@
           <a:p>
             <a:fld id="{89C4B140-6DEB-45EB-A5FE-2FE213A19AB6}" type="datetimeFigureOut">
               <a:rPr lang="pt-BR" smtClean="0"/>
-              <a:t>27/01/2023</a:t>
+              <a:t>08/03/2024</a:t>
             </a:fld>
             <a:endParaRPr lang="pt-BR"/>
           </a:p>
@@ -3261,7 +3261,7 @@
           <a:p>
             <a:fld id="{1BC5D9AF-0A3A-46C6-9823-3468E6F7B9BB}" type="slidenum">
               <a:rPr lang="pt-BR" smtClean="0"/>
-              <a:t>‹nº›</a:t>
+              <a:t>‹#›</a:t>
             </a:fld>
             <a:endParaRPr lang="pt-BR"/>
           </a:p>
@@ -3511,7 +3511,7 @@
           <a:p>
             <a:fld id="{89C4B140-6DEB-45EB-A5FE-2FE213A19AB6}" type="datetimeFigureOut">
               <a:rPr lang="pt-BR" smtClean="0"/>
-              <a:t>27/01/2023</a:t>
+              <a:t>08/03/2024</a:t>
             </a:fld>
             <a:endParaRPr lang="pt-BR"/>
           </a:p>
@@ -3569,7 +3569,7 @@
           <a:p>
             <a:fld id="{1BC5D9AF-0A3A-46C6-9823-3468E6F7B9BB}" type="slidenum">
               <a:rPr lang="pt-BR" smtClean="0"/>
-              <a:t>‹nº›</a:t>
+              <a:t>‹#›</a:t>
             </a:fld>
             <a:endParaRPr lang="pt-BR"/>
           </a:p>
@@ -3796,7 +3796,7 @@
           <a:p>
             <a:fld id="{89C4B140-6DEB-45EB-A5FE-2FE213A19AB6}" type="datetimeFigureOut">
               <a:rPr lang="pt-BR" smtClean="0"/>
-              <a:t>27/01/2023</a:t>
+              <a:t>08/03/2024</a:t>
             </a:fld>
             <a:endParaRPr lang="pt-BR"/>
           </a:p>
@@ -3854,7 +3854,7 @@
           <a:p>
             <a:fld id="{1BC5D9AF-0A3A-46C6-9823-3468E6F7B9BB}" type="slidenum">
               <a:rPr lang="pt-BR" smtClean="0"/>
-              <a:t>‹nº›</a:t>
+              <a:t>‹#›</a:t>
             </a:fld>
             <a:endParaRPr lang="pt-BR"/>
           </a:p>
@@ -4614,7 +4614,7 @@
         </p:nvSpPr>
         <p:spPr>
           <a:xfrm>
-            <a:off x="683568" y="908721"/>
+            <a:off x="683568" y="824642"/>
             <a:ext cx="7704856" cy="1224136"/>
           </a:xfrm>
           <a:prstGeom prst="roundRect">
@@ -4671,7 +4671,7 @@
         </p:nvSpPr>
         <p:spPr>
           <a:xfrm>
-            <a:off x="735997" y="1052736"/>
+            <a:off x="801415" y="975045"/>
             <a:ext cx="7469161" cy="923330"/>
           </a:xfrm>
           <a:prstGeom prst="rect">
@@ -4689,24 +4689,43 @@
           <a:p>
             <a:r>
               <a:rPr lang="pt-BR" sz="1800" dirty="0">
+                <a:highlight>
+                  <a:srgbClr val="FFFF00"/>
+                </a:highlight>
                 <a:latin typeface="Calibri" panose="020F0502020204030204" pitchFamily="34" charset="0"/>
               </a:rPr>
               <a:t>DISCIPLINA:   </a:t>
             </a:r>
             <a:r>
-              <a:rPr lang="it-IT" b="1" dirty="0"/>
+              <a:rPr lang="it-IT" b="1" dirty="0">
+                <a:highlight>
+                  <a:srgbClr val="FFFF00"/>
+                </a:highlight>
+              </a:rPr>
               <a:t>PROJETO DE SISTEMAS APLICADO AS MELHORES PRÁTICAS EM </a:t>
             </a:r>
           </a:p>
           <a:p>
             <a:r>
-              <a:rPr lang="it-IT" b="1" dirty="0"/>
+              <a:rPr lang="it-IT" b="1" dirty="0">
+                <a:highlight>
+                  <a:srgbClr val="FFFF00"/>
+                </a:highlight>
+              </a:rPr>
               <a:t>QUALIDADE DE SOFTWARE E GOVERNANÇA DE TI</a:t>
             </a:r>
-            <a:endParaRPr lang="pt-BR" b="1"/>
-          </a:p>
-          <a:p>
-            <a:endParaRPr lang="pt-BR" b="1" dirty="0"/>
+            <a:endParaRPr lang="pt-BR" b="1" dirty="0">
+              <a:highlight>
+                <a:srgbClr val="FFFF00"/>
+              </a:highlight>
+            </a:endParaRPr>
+          </a:p>
+          <a:p>
+            <a:endParaRPr lang="pt-BR" b="1" dirty="0">
+              <a:highlight>
+                <a:srgbClr val="FFFF00"/>
+              </a:highlight>
+            </a:endParaRPr>
           </a:p>
         </p:txBody>
       </p:sp>

</xml_diff>

<commit_message>
Alteracao de fundo do titulo
Alteracao de fundo do titulo(vermelho)
</commit_message>
<xml_diff>
--- a/PastaDocsKickoff/PITCH.pptx
+++ b/PastaDocsKickoff/PITCH.pptx
@@ -4614,7 +4614,7 @@
         </p:nvSpPr>
         <p:spPr>
           <a:xfrm>
-            <a:off x="683568" y="824642"/>
+            <a:off x="683568" y="908721"/>
             <a:ext cx="7704856" cy="1224136"/>
           </a:xfrm>
           <a:prstGeom prst="roundRect">
@@ -4671,7 +4671,7 @@
         </p:nvSpPr>
         <p:spPr>
           <a:xfrm>
-            <a:off x="801415" y="975045"/>
+            <a:off x="735997" y="1052736"/>
             <a:ext cx="7469161" cy="923330"/>
           </a:xfrm>
           <a:prstGeom prst="rect">
@@ -4690,7 +4690,7 @@
             <a:r>
               <a:rPr lang="pt-BR" sz="1800" dirty="0">
                 <a:highlight>
-                  <a:srgbClr val="FFFF00"/>
+                  <a:srgbClr val="FF0000"/>
                 </a:highlight>
                 <a:latin typeface="Calibri" panose="020F0502020204030204" pitchFamily="34" charset="0"/>
               </a:rPr>
@@ -4699,7 +4699,7 @@
             <a:r>
               <a:rPr lang="it-IT" b="1" dirty="0">
                 <a:highlight>
-                  <a:srgbClr val="FFFF00"/>
+                  <a:srgbClr val="FF0000"/>
                 </a:highlight>
               </a:rPr>
               <a:t>PROJETO DE SISTEMAS APLICADO AS MELHORES PRÁTICAS EM </a:t>
@@ -4709,23 +4709,19 @@
             <a:r>
               <a:rPr lang="it-IT" b="1" dirty="0">
                 <a:highlight>
-                  <a:srgbClr val="FFFF00"/>
+                  <a:srgbClr val="FF0000"/>
                 </a:highlight>
               </a:rPr>
               <a:t>QUALIDADE DE SOFTWARE E GOVERNANÇA DE TI</a:t>
             </a:r>
             <a:endParaRPr lang="pt-BR" b="1" dirty="0">
               <a:highlight>
-                <a:srgbClr val="FFFF00"/>
+                <a:srgbClr val="FF0000"/>
               </a:highlight>
             </a:endParaRPr>
           </a:p>
           <a:p>
-            <a:endParaRPr lang="pt-BR" b="1" dirty="0">
-              <a:highlight>
-                <a:srgbClr val="FFFF00"/>
-              </a:highlight>
-            </a:endParaRPr>
+            <a:endParaRPr lang="pt-BR" b="1" dirty="0"/>
           </a:p>
         </p:txBody>
       </p:sp>

</xml_diff>